<commit_message>
Add code to check disk space on macos
</commit_message>
<xml_diff>
--- a/presentations/testingForReproducibleResearch.pptx
+++ b/presentations/testingForReproducibleResearch.pptx
@@ -5,7 +5,7 @@
     <p:sldMasterId id="2147483648" r:id="rId1"/>
   </p:sldMasterIdLst>
   <p:notesMasterIdLst>
-    <p:notesMasterId r:id="rId25"/>
+    <p:notesMasterId r:id="rId26"/>
   </p:notesMasterIdLst>
   <p:sldIdLst>
     <p:sldId id="256" r:id="rId2"/>
@@ -29,8 +29,9 @@
     <p:sldId id="289" r:id="rId20"/>
     <p:sldId id="290" r:id="rId21"/>
     <p:sldId id="291" r:id="rId22"/>
-    <p:sldId id="276" r:id="rId23"/>
-    <p:sldId id="278" r:id="rId24"/>
+    <p:sldId id="294" r:id="rId23"/>
+    <p:sldId id="276" r:id="rId24"/>
+    <p:sldId id="278" r:id="rId25"/>
   </p:sldIdLst>
   <p:sldSz cx="12192000" cy="6858000"/>
   <p:notesSz cx="6858000" cy="9144000"/>
@@ -219,7 +220,7 @@
           <a:p>
             <a:fld id="{18A5D979-93FC-144A-AB28-6BA00BC12244}" type="datetimeFigureOut">
               <a:rPr lang="en-US" smtClean="0"/>
-              <a:t>8/20/22</a:t>
+              <a:t>8/21/22</a:t>
             </a:fld>
             <a:endParaRPr lang="en-US"/>
           </a:p>
@@ -717,7 +718,7 @@
           <a:p>
             <a:fld id="{211EC6DF-777A-4142-B847-255B1624343C}" type="datetimeFigureOut">
               <a:rPr lang="en-US" smtClean="0"/>
-              <a:t>8/20/22</a:t>
+              <a:t>8/21/22</a:t>
             </a:fld>
             <a:endParaRPr lang="en-US"/>
           </a:p>
@@ -915,7 +916,7 @@
           <a:p>
             <a:fld id="{211EC6DF-777A-4142-B847-255B1624343C}" type="datetimeFigureOut">
               <a:rPr lang="en-US" smtClean="0"/>
-              <a:t>8/20/22</a:t>
+              <a:t>8/21/22</a:t>
             </a:fld>
             <a:endParaRPr lang="en-US"/>
           </a:p>
@@ -1123,7 +1124,7 @@
           <a:p>
             <a:fld id="{211EC6DF-777A-4142-B847-255B1624343C}" type="datetimeFigureOut">
               <a:rPr lang="en-US" smtClean="0"/>
-              <a:t>8/20/22</a:t>
+              <a:t>8/21/22</a:t>
             </a:fld>
             <a:endParaRPr lang="en-US"/>
           </a:p>
@@ -1321,7 +1322,7 @@
           <a:p>
             <a:fld id="{211EC6DF-777A-4142-B847-255B1624343C}" type="datetimeFigureOut">
               <a:rPr lang="en-US" smtClean="0"/>
-              <a:t>8/20/22</a:t>
+              <a:t>8/21/22</a:t>
             </a:fld>
             <a:endParaRPr lang="en-US"/>
           </a:p>
@@ -1596,7 +1597,7 @@
           <a:p>
             <a:fld id="{211EC6DF-777A-4142-B847-255B1624343C}" type="datetimeFigureOut">
               <a:rPr lang="en-US" smtClean="0"/>
-              <a:t>8/20/22</a:t>
+              <a:t>8/21/22</a:t>
             </a:fld>
             <a:endParaRPr lang="en-US"/>
           </a:p>
@@ -1861,7 +1862,7 @@
           <a:p>
             <a:fld id="{211EC6DF-777A-4142-B847-255B1624343C}" type="datetimeFigureOut">
               <a:rPr lang="en-US" smtClean="0"/>
-              <a:t>8/20/22</a:t>
+              <a:t>8/21/22</a:t>
             </a:fld>
             <a:endParaRPr lang="en-US"/>
           </a:p>
@@ -2273,7 +2274,7 @@
           <a:p>
             <a:fld id="{211EC6DF-777A-4142-B847-255B1624343C}" type="datetimeFigureOut">
               <a:rPr lang="en-US" smtClean="0"/>
-              <a:t>8/20/22</a:t>
+              <a:t>8/21/22</a:t>
             </a:fld>
             <a:endParaRPr lang="en-US"/>
           </a:p>
@@ -2425,7 +2426,7 @@
           <a:p>
             <a:fld id="{211EC6DF-777A-4142-B847-255B1624343C}" type="datetimeFigureOut">
               <a:rPr lang="en-US" smtClean="0"/>
-              <a:t>8/20/22</a:t>
+              <a:t>8/21/22</a:t>
             </a:fld>
             <a:endParaRPr lang="en-US"/>
           </a:p>
@@ -2538,7 +2539,7 @@
           <a:p>
             <a:fld id="{211EC6DF-777A-4142-B847-255B1624343C}" type="datetimeFigureOut">
               <a:rPr lang="en-US" smtClean="0"/>
-              <a:t>8/20/22</a:t>
+              <a:t>8/21/22</a:t>
             </a:fld>
             <a:endParaRPr lang="en-US"/>
           </a:p>
@@ -2849,7 +2850,7 @@
           <a:p>
             <a:fld id="{211EC6DF-777A-4142-B847-255B1624343C}" type="datetimeFigureOut">
               <a:rPr lang="en-US" smtClean="0"/>
-              <a:t>8/20/22</a:t>
+              <a:t>8/21/22</a:t>
             </a:fld>
             <a:endParaRPr lang="en-US"/>
           </a:p>
@@ -3137,7 +3138,7 @@
           <a:p>
             <a:fld id="{211EC6DF-777A-4142-B847-255B1624343C}" type="datetimeFigureOut">
               <a:rPr lang="en-US" smtClean="0"/>
-              <a:t>8/20/22</a:t>
+              <a:t>8/21/22</a:t>
             </a:fld>
             <a:endParaRPr lang="en-US"/>
           </a:p>
@@ -3378,7 +3379,7 @@
           <a:p>
             <a:fld id="{211EC6DF-777A-4142-B847-255B1624343C}" type="datetimeFigureOut">
               <a:rPr lang="en-US" smtClean="0"/>
-              <a:t>8/20/22</a:t>
+              <a:t>8/21/22</a:t>
             </a:fld>
             <a:endParaRPr lang="en-US"/>
           </a:p>
@@ -4968,7 +4969,7 @@
         <p:spPr>
           <a:xfrm>
             <a:off x="8966200" y="2592470"/>
-            <a:ext cx="2921000" cy="1477328"/>
+            <a:ext cx="2921000" cy="2308324"/>
           </a:xfrm>
           <a:prstGeom prst="rect">
             <a:avLst/>
@@ -4998,6 +4999,16 @@
             <a:r>
               <a:rPr lang="en-US" dirty="0"/>
               <a:t>Incorrect coding of Mazda rotary engine as S, Porsche flat engine as V</a:t>
+            </a:r>
+          </a:p>
+          <a:p>
+            <a:pPr marL="285750" indent="-285750">
+              <a:buFont typeface="Arial" panose="020B0604020202020204" pitchFamily="34" charset="0"/>
+              <a:buChar char="•"/>
+            </a:pPr>
+            <a:r>
+              <a:rPr lang="en-US" dirty="0"/>
+              <a:t>Inclusion of a diesel powered vehicle (Mercedes 240D) </a:t>
             </a:r>
           </a:p>
         </p:txBody>
@@ -6233,7 +6244,7 @@
           <a:lstStyle/>
           <a:p>
             <a:r>
-              <a:rPr lang="en-US" sz="4800" kern="1200">
+              <a:rPr lang="en-US" sz="4800" kern="1200" dirty="0">
                 <a:solidFill>
                   <a:srgbClr val="FFFFFF"/>
                 </a:solidFill>
@@ -6241,7 +6252,7 @@
                 <a:ea typeface="+mj-ea"/>
                 <a:cs typeface="+mj-cs"/>
               </a:rPr>
-              <a:t>The runtime environment</a:t>
+              <a:t>Testing the runtime environment</a:t>
             </a:r>
           </a:p>
         </p:txBody>
@@ -7029,6 +7040,12 @@
               <a:t>Do I have a 64-bit operating system? </a:t>
             </a:r>
           </a:p>
+          <a:p>
+            <a:r>
+              <a:rPr lang="en-US" dirty="0"/>
+              <a:t>Do I have sufficient disk space to run the analysis? </a:t>
+            </a:r>
+          </a:p>
         </p:txBody>
       </p:sp>
       <p:sp>
@@ -7190,6 +7207,124 @@
       </p:grpSpPr>
       <p:sp>
         <p:nvSpPr>
+          <p:cNvPr id="2" name="Title 1">
+            <a:extLst>
+              <a:ext uri="{FF2B5EF4-FFF2-40B4-BE49-F238E27FC236}">
+                <a16:creationId xmlns:a16="http://schemas.microsoft.com/office/drawing/2014/main" id="{66B8BD23-08A9-90E7-F2FC-BD67B7B3CE60}"/>
+              </a:ext>
+            </a:extLst>
+          </p:cNvPr>
+          <p:cNvSpPr>
+            <a:spLocks noGrp="1"/>
+          </p:cNvSpPr>
+          <p:nvPr>
+            <p:ph type="title"/>
+          </p:nvPr>
+        </p:nvSpPr>
+        <p:spPr/>
+        <p:txBody>
+          <a:bodyPr/>
+          <a:lstStyle/>
+          <a:p>
+            <a:r>
+              <a:rPr lang="en-US" dirty="0"/>
+              <a:t>Checking disk space</a:t>
+            </a:r>
+          </a:p>
+        </p:txBody>
+      </p:sp>
+      <p:pic>
+        <p:nvPicPr>
+          <p:cNvPr id="5" name="Picture 4">
+            <a:extLst>
+              <a:ext uri="{FF2B5EF4-FFF2-40B4-BE49-F238E27FC236}">
+                <a16:creationId xmlns:a16="http://schemas.microsoft.com/office/drawing/2014/main" id="{641B9F9E-D8BE-54CE-B132-308599FD8951}"/>
+              </a:ext>
+            </a:extLst>
+          </p:cNvPr>
+          <p:cNvPicPr>
+            <a:picLocks noChangeAspect="1"/>
+          </p:cNvPicPr>
+          <p:nvPr/>
+        </p:nvPicPr>
+        <p:blipFill>
+          <a:blip r:embed="rId2"/>
+          <a:stretch>
+            <a:fillRect/>
+          </a:stretch>
+        </p:blipFill>
+        <p:spPr>
+          <a:xfrm>
+            <a:off x="985555" y="1213061"/>
+            <a:ext cx="6442379" cy="2720929"/>
+          </a:xfrm>
+          <a:prstGeom prst="rect">
+            <a:avLst/>
+          </a:prstGeom>
+        </p:spPr>
+      </p:pic>
+      <p:pic>
+        <p:nvPicPr>
+          <p:cNvPr id="6" name="Picture 5">
+            <a:extLst>
+              <a:ext uri="{FF2B5EF4-FFF2-40B4-BE49-F238E27FC236}">
+                <a16:creationId xmlns:a16="http://schemas.microsoft.com/office/drawing/2014/main" id="{FB076C32-6582-6D80-08ED-F81656D4800F}"/>
+              </a:ext>
+            </a:extLst>
+          </p:cNvPr>
+          <p:cNvPicPr>
+            <a:picLocks noChangeAspect="1"/>
+          </p:cNvPicPr>
+          <p:nvPr/>
+        </p:nvPicPr>
+        <p:blipFill>
+          <a:blip r:embed="rId3"/>
+          <a:stretch>
+            <a:fillRect/>
+          </a:stretch>
+        </p:blipFill>
+        <p:spPr>
+          <a:xfrm>
+            <a:off x="985555" y="4098832"/>
+            <a:ext cx="9007154" cy="2076500"/>
+          </a:xfrm>
+          <a:prstGeom prst="rect">
+            <a:avLst/>
+          </a:prstGeom>
+        </p:spPr>
+      </p:pic>
+    </p:spTree>
+    <p:extLst>
+      <p:ext uri="{BB962C8B-B14F-4D97-AF65-F5344CB8AC3E}">
+        <p14:creationId xmlns:p14="http://schemas.microsoft.com/office/powerpoint/2010/main" val="3015046129"/>
+      </p:ext>
+    </p:extLst>
+  </p:cSld>
+  <p:clrMapOvr>
+    <a:masterClrMapping/>
+  </p:clrMapOvr>
+</p:sld>
+</file>
+
+<file path=ppt/slides/slide23.xml><?xml version="1.0" encoding="utf-8"?>
+<p:sld xmlns:a="http://schemas.openxmlformats.org/drawingml/2006/main" xmlns:r="http://schemas.openxmlformats.org/officeDocument/2006/relationships" xmlns:p="http://schemas.openxmlformats.org/presentationml/2006/main">
+  <p:cSld>
+    <p:spTree>
+      <p:nvGrpSpPr>
+        <p:cNvPr id="1" name=""/>
+        <p:cNvGrpSpPr/>
+        <p:nvPr/>
+      </p:nvGrpSpPr>
+      <p:grpSpPr>
+        <a:xfrm>
+          <a:off x="0" y="0"/>
+          <a:ext cx="0" cy="0"/>
+          <a:chOff x="0" y="0"/>
+          <a:chExt cx="0" cy="0"/>
+        </a:xfrm>
+      </p:grpSpPr>
+      <p:sp>
+        <p:nvSpPr>
           <p:cNvPr id="3" name="TextBox 2">
             <a:extLst>
               <a:ext uri="{FF2B5EF4-FFF2-40B4-BE49-F238E27FC236}">
@@ -7236,7 +7371,7 @@
 </p:sld>
 </file>
 
-<file path=ppt/slides/slide23.xml><?xml version="1.0" encoding="utf-8"?>
+<file path=ppt/slides/slide24.xml><?xml version="1.0" encoding="utf-8"?>
 <p:sld xmlns:a="http://schemas.openxmlformats.org/drawingml/2006/main" xmlns:r="http://schemas.openxmlformats.org/officeDocument/2006/relationships" xmlns:p="http://schemas.openxmlformats.org/presentationml/2006/main">
   <p:cSld>
     <p:spTree>
@@ -8898,13 +9033,7 @@
           <a:lstStyle/>
           <a:p>
             <a:r>
-              <a:rPr lang="en-US" sz="1600" dirty="0">
-                <a:solidFill>
-                  <a:schemeClr val="accent1">
-                    <a:lumMod val="75000"/>
-                  </a:schemeClr>
-                </a:solidFill>
-              </a:rPr>
+              <a:rPr lang="en-US" sz="1600" dirty="0"/>
               <a:t>“As a &lt;role&gt; I want to &lt;do something&gt; so that &lt;statement of business value&gt; happens” </a:t>
             </a:r>
           </a:p>
@@ -8939,13 +9068,7 @@
           <a:lstStyle/>
           <a:p>
             <a:r>
-              <a:rPr lang="en-US" sz="1600" dirty="0">
-                <a:solidFill>
-                  <a:schemeClr val="accent1">
-                    <a:lumMod val="75000"/>
-                  </a:schemeClr>
-                </a:solidFill>
-              </a:rPr>
+              <a:rPr lang="en-US" sz="1600" dirty="0"/>
               <a:t>Statements indicating how we know that a story has been implemented correctly, including positive, negative, and edge cases</a:t>
             </a:r>
           </a:p>
@@ -8980,13 +9103,7 @@
           <a:lstStyle/>
           <a:p>
             <a:r>
-              <a:rPr lang="en-US" sz="1600" dirty="0">
-                <a:solidFill>
-                  <a:schemeClr val="accent1">
-                    <a:lumMod val="75000"/>
-                  </a:schemeClr>
-                </a:solidFill>
-              </a:rPr>
+              <a:rPr lang="en-US" sz="1600" dirty="0"/>
               <a:t>Behaviors required to support the story along with the information needed to support the behavior are assigned to components within the system </a:t>
             </a:r>
           </a:p>
@@ -9174,13 +9291,7 @@
           <a:lstStyle/>
           <a:p>
             <a:r>
-              <a:rPr lang="en-US" sz="1600" dirty="0">
-                <a:solidFill>
-                  <a:schemeClr val="accent1">
-                    <a:lumMod val="75000"/>
-                  </a:schemeClr>
-                </a:solidFill>
-              </a:rPr>
+              <a:rPr lang="en-US" sz="1600" dirty="0"/>
               <a:t>Code to support the required behaviors and information is developed within the programming language used for the software application in which the requirements are implemented </a:t>
             </a:r>
           </a:p>
@@ -9282,13 +9393,7 @@
           <a:lstStyle/>
           <a:p>
             <a:r>
-              <a:rPr lang="en-US" sz="1600" dirty="0">
-                <a:solidFill>
-                  <a:schemeClr val="accent1">
-                    <a:lumMod val="75000"/>
-                  </a:schemeClr>
-                </a:solidFill>
-              </a:rPr>
+              <a:rPr lang="en-US" sz="1600" dirty="0"/>
               <a:t>Various forms of testing are conducted to ensure the story fulfills the requirements, including unit testing, integration testing, user acceptance testing, and performance testing </a:t>
             </a:r>
           </a:p>
@@ -9432,9 +9537,10 @@
           <a:lstStyle/>
           <a:p>
             <a:r>
-              <a:rPr lang="en-US" dirty="0"/>
+              <a:rPr lang="en-US"/>
               <a:t>…but data science is different</a:t>
             </a:r>
+            <a:endParaRPr lang="en-US" dirty="0"/>
           </a:p>
         </p:txBody>
       </p:sp>
@@ -9964,7 +10070,7 @@
         <p:spPr>
           <a:xfrm>
             <a:off x="683044" y="2616537"/>
-            <a:ext cx="10175456" cy="1200329"/>
+            <a:ext cx="10175456" cy="1569660"/>
           </a:xfrm>
           <a:prstGeom prst="rect">
             <a:avLst/>
@@ -9981,6 +10087,9 @@
               <a:rPr lang="en-US" sz="2400" dirty="0"/>
               <a:t>The ability to verify that code run to reproduce an analysis is using the same data and algorithms as the original analysis by passing a set of assertions against the data and environment; making it easy for others to reproduce your analysis</a:t>
             </a:r>
+          </a:p>
+          <a:p>
+            <a:endParaRPr lang="en-US" sz="2400" dirty="0"/>
           </a:p>
         </p:txBody>
       </p:sp>

</xml_diff>